<commit_message>
NOJIRA Removed an extraneous trailing slash in the initial POST example.
</commit_message>
<xml_diff>
--- a/docs/allteam-061409-toranto/Toronto_Services_REST_APIs.pptx
+++ b/docs/allteam-061409-toranto/Toronto_Services_REST_APIs.pptx
@@ -4046,10 +4046,6 @@
               <a:rPr lang="en-US" dirty="0" smtClean="0"/>
               <a:t>Service</a:t>
             </a:r>
-            <a:r>
-              <a:rPr lang="en-US" dirty="0" smtClean="0"/>
-              <a:t/>
-            </a:r>
             <a:br>
               <a:rPr lang="en-US" dirty="0" smtClean="0"/>
             </a:br>
@@ -4580,25 +4576,7 @@
                 </a:solidFill>
                 <a:latin typeface="Arial" pitchFamily="80" charset="0"/>
               </a:rPr>
-              <a:t>HTTP status </a:t>
-            </a:r>
-            <a:r>
-              <a:rPr lang="en-US" sz="2400" dirty="0" smtClean="0">
-                <a:solidFill>
-                  <a:srgbClr val="000000"/>
-                </a:solidFill>
-                <a:latin typeface="Arial" pitchFamily="80" charset="0"/>
-              </a:rPr>
-              <a:t>codes </a:t>
-            </a:r>
-            <a:r>
-              <a:rPr lang="en-US" sz="2400" dirty="0" smtClean="0">
-                <a:solidFill>
-                  <a:srgbClr val="000000"/>
-                </a:solidFill>
-                <a:latin typeface="Arial" pitchFamily="80" charset="0"/>
-              </a:rPr>
-              <a:t>returned in the response header:</a:t>
+              <a:t>HTTP status codes returned in the response header:</a:t>
             </a:r>
             <a:br>
               <a:rPr lang="en-US" sz="2400" dirty="0" smtClean="0">
@@ -5683,34 +5661,7 @@
                 </a:solidFill>
                 <a:latin typeface="Arial" pitchFamily="80" charset="0"/>
               </a:rPr>
-              <a:t> </a:t>
-            </a:r>
-            <a:r>
-              <a:rPr lang="en-US" sz="2400" dirty="0" smtClean="0">
-                <a:solidFill>
-                  <a:srgbClr val="000000"/>
-                </a:solidFill>
-                <a:latin typeface="Arial" pitchFamily="80" charset="0"/>
-              </a:rPr>
-              <a:t>teams re REST</a:t>
-            </a:r>
-            <a:r>
-              <a:rPr lang="en-US" sz="2400" dirty="0" smtClean="0">
-                <a:solidFill>
-                  <a:srgbClr val="000000"/>
-                </a:solidFill>
-                <a:latin typeface="Arial" pitchFamily="80" charset="0"/>
-              </a:rPr>
-              <a:t>-based </a:t>
-            </a:r>
-            <a:r>
-              <a:rPr lang="en-US" sz="2400" dirty="0" smtClean="0">
-                <a:solidFill>
-                  <a:srgbClr val="000000"/>
-                </a:solidFill>
-                <a:latin typeface="Arial" pitchFamily="80" charset="0"/>
-              </a:rPr>
-              <a:t>APIs.</a:t>
+              <a:t> teams re REST-based APIs.</a:t>
             </a:r>
           </a:p>
           <a:p>
@@ -5925,25 +5876,7 @@
                 </a:solidFill>
                 <a:latin typeface="Arial" pitchFamily="80" charset="0"/>
               </a:rPr>
-              <a:t>: </a:t>
-            </a:r>
-            <a:r>
-              <a:rPr lang="en-US" sz="3200" dirty="0" smtClean="0">
-                <a:solidFill>
-                  <a:srgbClr val="000000"/>
-                </a:solidFill>
-                <a:latin typeface="Arial" pitchFamily="80" charset="0"/>
-              </a:rPr>
-              <a:t>REST-based </a:t>
-            </a:r>
-            <a:r>
-              <a:rPr lang="en-US" sz="3200" dirty="0" smtClean="0">
-                <a:solidFill>
-                  <a:srgbClr val="000000"/>
-                </a:solidFill>
-                <a:latin typeface="Arial" pitchFamily="80" charset="0"/>
-              </a:rPr>
-              <a:t>APIs</a:t>
+              <a:t>: REST-based APIs</a:t>
             </a:r>
             <a:br>
               <a:rPr lang="en-US" sz="3200" dirty="0" smtClean="0">
@@ -7121,7 +7054,25 @@
                 </a:solidFill>
                 <a:latin typeface="Courier New" pitchFamily="80" charset="0"/>
               </a:rPr>
-              <a:t>POST /collectionobjects/</a:t>
+              <a:t>POST </a:t>
+            </a:r>
+            <a:r>
+              <a:rPr lang="en-US" sz="2400" b="1" smtClean="0">
+                <a:solidFill>
+                  <a:srgbClr val="3333CC"/>
+                </a:solidFill>
+                <a:latin typeface="Courier New" pitchFamily="80" charset="0"/>
+              </a:rPr>
+              <a:t>/</a:t>
+            </a:r>
+            <a:r>
+              <a:rPr lang="en-US" sz="2400" b="1" smtClean="0">
+                <a:solidFill>
+                  <a:srgbClr val="3333CC"/>
+                </a:solidFill>
+                <a:latin typeface="Courier New" pitchFamily="80" charset="0"/>
+              </a:rPr>
+              <a:t>collectionobjects</a:t>
             </a:r>
           </a:p>
           <a:p>

</xml_diff>